<commit_message>
Agregando métodos de Moving Average a la serie de Demanda electrico y probando modelos SARIMA_parte2
</commit_message>
<xml_diff>
--- a/CARTEL_PRONOSTICOS_Modelos_de_pronostico_aplicados_a_ademanda_De_gas_natural.pptx
+++ b/CARTEL_PRONOSTICOS_Modelos_de_pronostico_aplicados_a_ademanda_De_gas_natural.pptx
@@ -274,7 +274,7 @@
       </p15:sldGuideLst>
     </p:ext>
     <p:ext uri="http://customooxmlschemas.google.com/">
-      <go:slidesCustomData xmlns:go="http://customooxmlschemas.google.com/" xmlns:ahyp="http://schemas.microsoft.com/office/drawing/2018/hyperlinkcolor" xmlns:p15="http://schemas.microsoft.com/office/powerpoint/2012/main" xmlns:p14="http://schemas.microsoft.com/office/powerpoint/2010/main" xmlns:com="http://schemas.openxmlformats.org/drawingml/2006/compatibility" xmlns:pvml="urn:schemas-microsoft-com:office:powerpoint" xmlns:v="urn:schemas-microsoft-com:vml" xmlns:o="urn:schemas-microsoft-com:office:office" xmlns:dgm="http://schemas.openxmlformats.org/drawingml/2006/diagram" xmlns:c="http://schemas.openxmlformats.org/drawingml/2006/chart" xmlns:mv="urn:schemas-microsoft-com:mac:vml" xmlns:mc="http://schemas.openxmlformats.org/markup-compatibility/2006" xmlns="" r:id="rId16" roundtripDataSignature="AMtx7miQDVQXGM3vnSjUw7xkqrap4wCZRg=="/>
+      <go:slidesCustomData xmlns="" xmlns:mc="http://schemas.openxmlformats.org/markup-compatibility/2006" xmlns:mv="urn:schemas-microsoft-com:mac:vml" xmlns:c="http://schemas.openxmlformats.org/drawingml/2006/chart" xmlns:dgm="http://schemas.openxmlformats.org/drawingml/2006/diagram" xmlns:o="urn:schemas-microsoft-com:office:office" xmlns:v="urn:schemas-microsoft-com:vml" xmlns:pvml="urn:schemas-microsoft-com:office:powerpoint" xmlns:com="http://schemas.openxmlformats.org/drawingml/2006/compatibility" xmlns:p14="http://schemas.microsoft.com/office/powerpoint/2010/main" xmlns:p15="http://schemas.microsoft.com/office/powerpoint/2012/main" xmlns:ahyp="http://schemas.microsoft.com/office/drawing/2018/hyperlinkcolor" xmlns:go="http://customooxmlschemas.google.com/" r:id="rId16" roundtripDataSignature="AMtx7miQDVQXGM3vnSjUw7xkqrap4wCZRg=="/>
     </p:ext>
   </p:extLst>
 </p:presentation>
@@ -283,9 +283,87 @@
 <file path=ppt/revisionInfo.xml><?xml version="1.0" encoding="utf-8"?>
 <p1510:revInfo xmlns:a="http://schemas.openxmlformats.org/drawingml/2006/main" xmlns:r="http://schemas.openxmlformats.org/officeDocument/2006/relationships" xmlns:p1510="http://schemas.microsoft.com/office/powerpoint/2015/10/main">
   <p1510:revLst>
+    <p1510:client id="{0C86D9EE-33D9-4C17-96EF-D0137C55CEC4}" v="74" dt="2023-05-22T19:11:12.052"/>
     <p1510:client id="{30D631A8-8D3B-4428-BFA1-7F8C22E2221C}" v="5" dt="2023-05-22T17:20:15.766"/>
   </p1510:revLst>
 </p1510:revInfo>
+</file>
+
+<file path=ppt/changesInfos/changesInfo1.xml><?xml version="1.0" encoding="utf-8"?>
+<pc:chgInfo xmlns:a="http://schemas.openxmlformats.org/drawingml/2006/main" xmlns:r="http://schemas.openxmlformats.org/officeDocument/2006/relationships" xmlns:ac="http://schemas.microsoft.com/office/drawing/2013/main/command" xmlns:pc="http://schemas.microsoft.com/office/powerpoint/2013/main/command">
+  <pc:docChgLst>
+    <pc:chgData name="Sergio Ibarra" userId="f9e6e0322c927b48" providerId="LiveId" clId="{0C86D9EE-33D9-4C17-96EF-D0137C55CEC4}"/>
+    <pc:docChg chg="undo custSel modSld">
+      <pc:chgData name="Sergio Ibarra" userId="f9e6e0322c927b48" providerId="LiveId" clId="{0C86D9EE-33D9-4C17-96EF-D0137C55CEC4}" dt="2023-05-22T19:11:17.662" v="1378" actId="478"/>
+      <pc:docMkLst>
+        <pc:docMk/>
+      </pc:docMkLst>
+      <pc:sldChg chg="delSp modSp mod">
+        <pc:chgData name="Sergio Ibarra" userId="f9e6e0322c927b48" providerId="LiveId" clId="{0C86D9EE-33D9-4C17-96EF-D0137C55CEC4}" dt="2023-05-22T19:11:17.662" v="1378" actId="478"/>
+        <pc:sldMkLst>
+          <pc:docMk/>
+          <pc:sldMk cId="2665960598" sldId="261"/>
+        </pc:sldMkLst>
+        <pc:spChg chg="mod">
+          <ac:chgData name="Sergio Ibarra" userId="f9e6e0322c927b48" providerId="LiveId" clId="{0C86D9EE-33D9-4C17-96EF-D0137C55CEC4}" dt="2023-05-22T18:47:51.948" v="580" actId="20577"/>
+          <ac:spMkLst>
+            <pc:docMk/>
+            <pc:sldMk cId="2665960598" sldId="261"/>
+            <ac:spMk id="6" creationId="{19860553-E3AD-FBF8-3CFF-86641C821CF8}"/>
+          </ac:spMkLst>
+        </pc:spChg>
+        <pc:spChg chg="mod">
+          <ac:chgData name="Sergio Ibarra" userId="f9e6e0322c927b48" providerId="LiveId" clId="{0C86D9EE-33D9-4C17-96EF-D0137C55CEC4}" dt="2023-05-22T19:11:12.052" v="1377" actId="255"/>
+          <ac:spMkLst>
+            <pc:docMk/>
+            <pc:sldMk cId="2665960598" sldId="261"/>
+            <ac:spMk id="7" creationId="{D710EB25-DDE1-53D5-9BFB-95579D8E7A2D}"/>
+          </ac:spMkLst>
+        </pc:spChg>
+        <pc:spChg chg="mod">
+          <ac:chgData name="Sergio Ibarra" userId="f9e6e0322c927b48" providerId="LiveId" clId="{0C86D9EE-33D9-4C17-96EF-D0137C55CEC4}" dt="2023-05-22T19:10:56.312" v="1373" actId="14100"/>
+          <ac:spMkLst>
+            <pc:docMk/>
+            <pc:sldMk cId="2665960598" sldId="261"/>
+            <ac:spMk id="14" creationId="{ED21C892-A308-1335-8AEB-1404693A35E7}"/>
+          </ac:spMkLst>
+        </pc:spChg>
+        <pc:spChg chg="del">
+          <ac:chgData name="Sergio Ibarra" userId="f9e6e0322c927b48" providerId="LiveId" clId="{0C86D9EE-33D9-4C17-96EF-D0137C55CEC4}" dt="2023-05-22T19:11:17.662" v="1378" actId="478"/>
+          <ac:spMkLst>
+            <pc:docMk/>
+            <pc:sldMk cId="2665960598" sldId="261"/>
+            <ac:spMk id="15" creationId="{65D4916B-7BE9-5B74-0DAB-4413788FAF6A}"/>
+          </ac:spMkLst>
+        </pc:spChg>
+        <pc:spChg chg="mod">
+          <ac:chgData name="Sergio Ibarra" userId="f9e6e0322c927b48" providerId="LiveId" clId="{0C86D9EE-33D9-4C17-96EF-D0137C55CEC4}" dt="2023-05-22T18:48:10.172" v="581" actId="790"/>
+          <ac:spMkLst>
+            <pc:docMk/>
+            <pc:sldMk cId="2665960598" sldId="261"/>
+            <ac:spMk id="86" creationId="{00000000-0000-0000-0000-000000000000}"/>
+          </ac:spMkLst>
+        </pc:spChg>
+        <pc:spChg chg="mod">
+          <ac:chgData name="Sergio Ibarra" userId="f9e6e0322c927b48" providerId="LiveId" clId="{0C86D9EE-33D9-4C17-96EF-D0137C55CEC4}" dt="2023-05-22T18:45:23.914" v="114" actId="20577"/>
+          <ac:spMkLst>
+            <pc:docMk/>
+            <pc:sldMk cId="2665960598" sldId="261"/>
+            <ac:spMk id="89" creationId="{00000000-0000-0000-0000-000000000000}"/>
+          </ac:spMkLst>
+        </pc:spChg>
+        <pc:spChg chg="mod">
+          <ac:chgData name="Sergio Ibarra" userId="f9e6e0322c927b48" providerId="LiveId" clId="{0C86D9EE-33D9-4C17-96EF-D0137C55CEC4}" dt="2023-05-22T18:47:25.768" v="501" actId="20577"/>
+          <ac:spMkLst>
+            <pc:docMk/>
+            <pc:sldMk cId="2665960598" sldId="261"/>
+            <ac:spMk id="91" creationId="{00000000-0000-0000-0000-000000000000}"/>
+          </ac:spMkLst>
+        </pc:spChg>
+      </pc:sldChg>
+    </pc:docChg>
+  </pc:docChgLst>
+</pc:chgInfo>
 </file>
 
 <file path=ppt/notesMasters/notesMaster1.xml><?xml version="1.0" encoding="utf-8"?>
@@ -12731,7 +12809,7 @@
               <a:buNone/>
             </a:pPr>
             <a:r>
-              <a:rPr lang="en-US" sz="1300" b="1" dirty="0" err="1">
+              <a:rPr lang="es-MX" sz="1300" b="1" dirty="0">
                 <a:solidFill>
                   <a:schemeClr val="tx1"/>
                 </a:solidFill>
@@ -12919,7 +12997,7 @@
         <p:spPr>
           <a:xfrm>
             <a:off x="549179" y="2812588"/>
-            <a:ext cx="4258545" cy="710582"/>
+            <a:ext cx="4258545" cy="535150"/>
           </a:xfrm>
           <a:prstGeom prst="rect">
             <a:avLst/>
@@ -12962,27 +13040,8 @@
                 <a:cs typeface="Encode Sans ExtraLight"/>
                 <a:sym typeface="Encode Sans ExtraLight"/>
               </a:rPr>
-              <a:t>Demostrar la aplicación de la teoría de redes como metodología para resolver una situación de la vida real. (árbol de mínima expansión en recorridos de sitios turísticos en la CDMX)</a:t>
+              <a:t>Demostrar la aplicación de distintos modelos de pronóstico para el caso de la demanda de Gas Natural en el sector eléctrico mexicano. </a:t>
             </a:r>
-          </a:p>
-          <a:p>
-            <a:pPr marL="0" marR="0" lvl="0" indent="0" algn="just" rtl="0">
-              <a:lnSpc>
-                <a:spcPct val="95000"/>
-              </a:lnSpc>
-              <a:spcBef>
-                <a:spcPts val="0"/>
-              </a:spcBef>
-              <a:spcAft>
-                <a:spcPts val="0"/>
-              </a:spcAft>
-              <a:buClr>
-                <a:schemeClr val="dk1"/>
-              </a:buClr>
-              <a:buSzPts val="1200"/>
-              <a:buFont typeface="Times New Roman"/>
-              <a:buNone/>
-            </a:pPr>
             <a:endParaRPr sz="1200" dirty="0">
               <a:solidFill>
                 <a:schemeClr val="dk1"/>
@@ -13110,7 +13169,7 @@
               <a:buFont typeface="Arial"/>
               <a:buNone/>
             </a:pPr>
-            <a:endParaRPr sz="1200" b="0" i="0" u="sng">
+            <a:endParaRPr sz="1200" b="0" i="0" u="sng" dirty="0">
               <a:solidFill>
                 <a:schemeClr val="dk1"/>
               </a:solidFill>
@@ -13290,8 +13349,8 @@
         </p:nvSpPr>
         <p:spPr>
           <a:xfrm>
-            <a:off x="5063067" y="2771461"/>
-            <a:ext cx="4291099" cy="535150"/>
+            <a:off x="5063067" y="2593685"/>
+            <a:ext cx="4291099" cy="1178403"/>
           </a:xfrm>
           <a:prstGeom prst="rect">
             <a:avLst/>
@@ -13324,93 +13383,718 @@
                 <a:latin typeface="+mn-lt"/>
                 <a:sym typeface="Encode Sans ExtraLight"/>
               </a:rPr>
-              <a:t>Un turista desea conocer la zona centro de la ciudad de México y para ello se propone visitar la mayor cantidad de sitios turísticos posibles en el menor recorrido viable.</a:t>
+              <a:t>Se cuentan con datos mensuales desde Enero de 2005 hasta Septiembre de 2022 sobre la demanda de gas natural que se usa para producir energía eléctrica en México. </a:t>
+            </a:r>
+          </a:p>
+          <a:p>
+            <a:pPr algn="just">
+              <a:lnSpc>
+                <a:spcPct val="95000"/>
+              </a:lnSpc>
+              <a:buClr>
+                <a:schemeClr val="dk1"/>
+              </a:buClr>
+              <a:buSzPts val="1200"/>
+            </a:pPr>
+            <a:r>
+              <a:rPr lang="es-MX" sz="1100" dirty="0">
+                <a:solidFill>
+                  <a:schemeClr val="tx1"/>
+                </a:solidFill>
+                <a:latin typeface="+mn-lt"/>
+                <a:sym typeface="Encode Sans ExtraLight"/>
+              </a:rPr>
+              <a:t>Históricamente la Secretaría de Energía (SENER) había hecho hasta 2018 un Informe Anual sobre gas natural en donde prospectaba consumos a 10-12 años con un error MAPE promedio de 20-25% </a:t>
             </a:r>
           </a:p>
         </p:txBody>
       </p:sp>
-      <p:sp>
-        <p:nvSpPr>
-          <p:cNvPr id="7" name="Google Shape;88;p1">
-            <a:extLst>
-              <a:ext uri="{FF2B5EF4-FFF2-40B4-BE49-F238E27FC236}">
-                <a16:creationId xmlns:a16="http://schemas.microsoft.com/office/drawing/2014/main" id="{D710EB25-DDE1-53D5-9BFB-95579D8E7A2D}"/>
-              </a:ext>
-            </a:extLst>
-          </p:cNvPr>
-          <p:cNvSpPr/>
-          <p:nvPr/>
-        </p:nvSpPr>
-        <p:spPr>
-          <a:xfrm>
-            <a:off x="318486" y="3927582"/>
-            <a:ext cx="9134090" cy="3255285"/>
-          </a:xfrm>
-          <a:prstGeom prst="roundRect">
-            <a:avLst>
-              <a:gd name="adj" fmla="val 1512"/>
-            </a:avLst>
-          </a:prstGeom>
-          <a:solidFill>
-            <a:schemeClr val="accent5"/>
-          </a:solidFill>
-          <a:ln w="9525" cap="flat" cmpd="sng">
-            <a:solidFill>
-              <a:schemeClr val="dk1"/>
-            </a:solidFill>
-            <a:prstDash val="solid"/>
-            <a:miter lim="800000"/>
-            <a:headEnd type="none" w="sm" len="sm"/>
-            <a:tailEnd type="none" w="sm" len="sm"/>
-          </a:ln>
-        </p:spPr>
-        <p:txBody>
-          <a:bodyPr spcFirstLastPara="1" wrap="square" lIns="91425" tIns="45700" rIns="91425" bIns="45700" anchor="ctr" anchorCtr="0">
-            <a:noAutofit/>
-          </a:bodyPr>
-          <a:lstStyle/>
-          <a:p>
-            <a:pPr marL="0" lvl="0" indent="0" algn="just" rtl="0">
-              <a:lnSpc>
-                <a:spcPct val="95000"/>
-              </a:lnSpc>
-              <a:spcBef>
-                <a:spcPts val="0"/>
-              </a:spcBef>
-              <a:spcAft>
-                <a:spcPts val="0"/>
-              </a:spcAft>
-              <a:buClr>
-                <a:schemeClr val="dk1"/>
-              </a:buClr>
-              <a:buSzPts val="1200"/>
-              <a:buFont typeface="Times New Roman"/>
-              <a:buNone/>
-            </a:pPr>
-            <a:r>
-              <a:rPr lang="en-US" sz="1200" dirty="0">
+      <mc:AlternateContent xmlns:mc="http://schemas.openxmlformats.org/markup-compatibility/2006">
+        <mc:Choice xmlns:a14="http://schemas.microsoft.com/office/drawing/2010/main" Requires="a14">
+          <p:sp>
+            <p:nvSpPr>
+              <p:cNvPr id="7" name="Google Shape;88;p1">
+                <a:extLst>
+                  <a:ext uri="{FF2B5EF4-FFF2-40B4-BE49-F238E27FC236}">
+                    <a16:creationId xmlns:a16="http://schemas.microsoft.com/office/drawing/2014/main" id="{D710EB25-DDE1-53D5-9BFB-95579D8E7A2D}"/>
+                  </a:ext>
+                </a:extLst>
+              </p:cNvPr>
+              <p:cNvSpPr/>
+              <p:nvPr/>
+            </p:nvSpPr>
+            <p:spPr>
+              <a:xfrm>
+                <a:off x="318486" y="3927582"/>
+                <a:ext cx="9134090" cy="3255285"/>
+              </a:xfrm>
+              <a:prstGeom prst="roundRect">
+                <a:avLst>
+                  <a:gd name="adj" fmla="val 1512"/>
+                </a:avLst>
+              </a:prstGeom>
+              <a:solidFill>
+                <a:schemeClr val="accent5"/>
+              </a:solidFill>
+              <a:ln w="9525" cap="flat" cmpd="sng">
                 <a:solidFill>
                   <a:schemeClr val="dk1"/>
                 </a:solidFill>
-                <a:latin typeface="Encode Sans Thin"/>
-                <a:ea typeface="Encode Sans Thin"/>
-                <a:cs typeface="Encode Sans Thin"/>
-                <a:sym typeface="Encode Sans Thin"/>
-              </a:rPr>
-              <a:t>  </a:t>
-            </a:r>
-            <a:endParaRPr lang="en-US" sz="1200" b="0" i="0" u="sng" dirty="0">
-              <a:solidFill>
-                <a:schemeClr val="dk1"/>
-              </a:solidFill>
-              <a:latin typeface="Arial"/>
-              <a:ea typeface="Arial"/>
-              <a:cs typeface="Arial"/>
-              <a:sym typeface="Arial"/>
-            </a:endParaRPr>
-          </a:p>
-        </p:txBody>
-      </p:sp>
+                <a:prstDash val="solid"/>
+                <a:miter lim="800000"/>
+                <a:headEnd type="none" w="sm" len="sm"/>
+                <a:tailEnd type="none" w="sm" len="sm"/>
+              </a:ln>
+            </p:spPr>
+            <p:txBody>
+              <a:bodyPr spcFirstLastPara="1" wrap="square" lIns="91425" tIns="45700" rIns="91425" bIns="45700" anchor="ctr" anchorCtr="0">
+                <a:noAutofit/>
+              </a:bodyPr>
+              <a:lstStyle/>
+              <a:p>
+                <a:pPr lvl="0" algn="ctr">
+                  <a:lnSpc>
+                    <a:spcPct val="95000"/>
+                  </a:lnSpc>
+                  <a:buClr>
+                    <a:schemeClr val="dk1"/>
+                  </a:buClr>
+                  <a:buSzPts val="1200"/>
+                </a:pPr>
+                <a:r>
+                  <a:rPr lang="en-US" sz="1000" dirty="0">
+                    <a:solidFill>
+                      <a:schemeClr val="dk1"/>
+                    </a:solidFill>
+                    <a:latin typeface="+mn-lt"/>
+                    <a:ea typeface="Encode Sans Thin"/>
+                    <a:cs typeface="Encode Sans Thin"/>
+                    <a:sym typeface="Encode Sans Thin"/>
+                  </a:rPr>
+                  <a:t>y</a:t>
+                </a:r>
+                <a14:m>
+                  <m:oMath xmlns:m="http://schemas.openxmlformats.org/officeDocument/2006/math">
+                    <m:r>
+                      <a:rPr lang="es-MX" sz="1000" b="0" i="0" smtClean="0">
+                        <a:solidFill>
+                          <a:schemeClr val="dk1"/>
+                        </a:solidFill>
+                        <a:latin typeface="+mn-lt"/>
+                        <a:ea typeface="Encode Sans Thin"/>
+                        <a:cs typeface="Encode Sans Thin"/>
+                        <a:sym typeface="Encode Sans Thin"/>
+                      </a:rPr>
+                      <m:t> </m:t>
+                    </m:r>
+                    <m:r>
+                      <a:rPr lang="en-US" sz="1000" i="1" smtClean="0">
+                        <a:solidFill>
+                          <a:schemeClr val="dk1"/>
+                        </a:solidFill>
+                        <a:latin typeface="+mn-lt"/>
+                        <a:ea typeface="Encode Sans Thin"/>
+                        <a:cs typeface="Encode Sans Thin"/>
+                        <a:sym typeface="Encode Sans Thin"/>
+                      </a:rPr>
+                      <m:t>=</m:t>
+                    </m:r>
+                    <m:r>
+                      <a:rPr lang="en-US" sz="1000" i="1" smtClean="0">
+                        <a:solidFill>
+                          <a:schemeClr val="dk1"/>
+                        </a:solidFill>
+                        <a:latin typeface="+mn-lt"/>
+                        <a:ea typeface="Encode Sans Thin"/>
+                        <a:cs typeface="Encode Sans Thin"/>
+                        <a:sym typeface="Encode Sans Thin"/>
+                      </a:rPr>
+                      <m:t>𝛽</m:t>
+                    </m:r>
+                    <m:r>
+                      <a:rPr lang="es-MX" sz="1000" b="0" i="1" smtClean="0">
+                        <a:solidFill>
+                          <a:schemeClr val="dk1"/>
+                        </a:solidFill>
+                        <a:latin typeface="+mn-lt"/>
+                        <a:ea typeface="Encode Sans Thin"/>
+                        <a:cs typeface="Encode Sans Thin"/>
+                        <a:sym typeface="Encode Sans Thin"/>
+                      </a:rPr>
+                      <m:t>0+</m:t>
+                    </m:r>
+                    <m:r>
+                      <a:rPr lang="en-US" sz="1000" i="1">
+                        <a:solidFill>
+                          <a:schemeClr val="dk1"/>
+                        </a:solidFill>
+                        <a:latin typeface="+mn-lt"/>
+                        <a:ea typeface="Encode Sans Thin"/>
+                        <a:cs typeface="Encode Sans Thin"/>
+                        <a:sym typeface="Encode Sans Thin"/>
+                      </a:rPr>
+                      <m:t>𝛽</m:t>
+                    </m:r>
+                    <m:r>
+                      <a:rPr lang="es-MX" sz="1000" b="0" i="1" smtClean="0">
+                        <a:solidFill>
+                          <a:schemeClr val="dk1"/>
+                        </a:solidFill>
+                        <a:latin typeface="+mn-lt"/>
+                        <a:ea typeface="Encode Sans Thin"/>
+                        <a:cs typeface="Encode Sans Thin"/>
+                        <a:sym typeface="Encode Sans Thin"/>
+                      </a:rPr>
+                      <m:t>1 ∗</m:t>
+                    </m:r>
+                    <m:r>
+                      <a:rPr lang="es-MX" sz="1000" b="0" i="1" smtClean="0">
+                        <a:solidFill>
+                          <a:schemeClr val="dk1"/>
+                        </a:solidFill>
+                        <a:latin typeface="+mn-lt"/>
+                        <a:ea typeface="Encode Sans Thin"/>
+                        <a:cs typeface="Encode Sans Thin"/>
+                        <a:sym typeface="Encode Sans Thin"/>
+                      </a:rPr>
+                      <m:t>𝑥</m:t>
+                    </m:r>
+                    <m:r>
+                      <a:rPr lang="es-MX" sz="1000" b="0" i="1" smtClean="0">
+                        <a:solidFill>
+                          <a:schemeClr val="dk1"/>
+                        </a:solidFill>
+                        <a:latin typeface="+mn-lt"/>
+                        <a:ea typeface="Encode Sans Thin"/>
+                        <a:cs typeface="Encode Sans Thin"/>
+                        <a:sym typeface="Encode Sans Thin"/>
+                      </a:rPr>
+                      <m:t>1++</m:t>
+                    </m:r>
+                    <m:r>
+                      <a:rPr lang="en-US" sz="1000" i="1">
+                        <a:solidFill>
+                          <a:schemeClr val="dk1"/>
+                        </a:solidFill>
+                        <a:latin typeface="+mn-lt"/>
+                        <a:ea typeface="Encode Sans Thin"/>
+                        <a:cs typeface="Encode Sans Thin"/>
+                        <a:sym typeface="Encode Sans Thin"/>
+                      </a:rPr>
+                      <m:t>𝛽</m:t>
+                    </m:r>
+                    <m:r>
+                      <a:rPr lang="es-MX" sz="1000" b="0" i="1" smtClean="0">
+                        <a:solidFill>
+                          <a:schemeClr val="dk1"/>
+                        </a:solidFill>
+                        <a:latin typeface="+mn-lt"/>
+                        <a:ea typeface="Encode Sans Thin"/>
+                        <a:cs typeface="Encode Sans Thin"/>
+                        <a:sym typeface="Encode Sans Thin"/>
+                      </a:rPr>
+                      <m:t>2</m:t>
+                    </m:r>
+                    <m:r>
+                      <a:rPr lang="es-MX" sz="1000" i="1">
+                        <a:solidFill>
+                          <a:schemeClr val="dk1"/>
+                        </a:solidFill>
+                        <a:latin typeface="+mn-lt"/>
+                        <a:ea typeface="Encode Sans Thin"/>
+                        <a:cs typeface="Encode Sans Thin"/>
+                        <a:sym typeface="Encode Sans Thin"/>
+                      </a:rPr>
+                      <m:t> ∗</m:t>
+                    </m:r>
+                    <m:r>
+                      <a:rPr lang="es-MX" sz="1000" i="1">
+                        <a:solidFill>
+                          <a:schemeClr val="dk1"/>
+                        </a:solidFill>
+                        <a:latin typeface="+mn-lt"/>
+                        <a:ea typeface="Encode Sans Thin"/>
+                        <a:cs typeface="Encode Sans Thin"/>
+                        <a:sym typeface="Encode Sans Thin"/>
+                      </a:rPr>
+                      <m:t>𝑥</m:t>
+                    </m:r>
+                    <m:r>
+                      <a:rPr lang="es-MX" sz="1000" b="0" i="1" smtClean="0">
+                        <a:solidFill>
+                          <a:schemeClr val="dk1"/>
+                        </a:solidFill>
+                        <a:latin typeface="+mn-lt"/>
+                        <a:ea typeface="Encode Sans Thin"/>
+                        <a:cs typeface="Encode Sans Thin"/>
+                        <a:sym typeface="Encode Sans Thin"/>
+                      </a:rPr>
+                      <m:t>2+</m:t>
+                    </m:r>
+                    <m:r>
+                      <a:rPr lang="es-MX" sz="1000" i="1">
+                        <a:solidFill>
+                          <a:schemeClr val="dk1"/>
+                        </a:solidFill>
+                        <a:latin typeface="+mn-lt"/>
+                        <a:ea typeface="Encode Sans Thin"/>
+                        <a:cs typeface="Encode Sans Thin"/>
+                        <a:sym typeface="Encode Sans Thin"/>
+                      </a:rPr>
+                      <m:t>+</m:t>
+                    </m:r>
+                    <m:r>
+                      <a:rPr lang="en-US" sz="1000" i="1">
+                        <a:solidFill>
+                          <a:schemeClr val="dk1"/>
+                        </a:solidFill>
+                        <a:latin typeface="+mn-lt"/>
+                        <a:ea typeface="Encode Sans Thin"/>
+                        <a:cs typeface="Encode Sans Thin"/>
+                        <a:sym typeface="Encode Sans Thin"/>
+                      </a:rPr>
+                      <m:t>𝛽</m:t>
+                    </m:r>
+                    <m:r>
+                      <a:rPr lang="es-MX" sz="1000" b="0" i="1" smtClean="0">
+                        <a:solidFill>
+                          <a:schemeClr val="dk1"/>
+                        </a:solidFill>
+                        <a:latin typeface="+mn-lt"/>
+                        <a:ea typeface="Encode Sans Thin"/>
+                        <a:cs typeface="Encode Sans Thin"/>
+                        <a:sym typeface="Encode Sans Thin"/>
+                      </a:rPr>
+                      <m:t>3</m:t>
+                    </m:r>
+                    <m:r>
+                      <a:rPr lang="es-MX" sz="1000" i="1">
+                        <a:solidFill>
+                          <a:schemeClr val="dk1"/>
+                        </a:solidFill>
+                        <a:latin typeface="+mn-lt"/>
+                        <a:ea typeface="Encode Sans Thin"/>
+                        <a:cs typeface="Encode Sans Thin"/>
+                        <a:sym typeface="Encode Sans Thin"/>
+                      </a:rPr>
+                      <m:t> ∗</m:t>
+                    </m:r>
+                    <m:r>
+                      <a:rPr lang="es-MX" sz="1000" i="1">
+                        <a:solidFill>
+                          <a:schemeClr val="dk1"/>
+                        </a:solidFill>
+                        <a:latin typeface="+mn-lt"/>
+                        <a:ea typeface="Encode Sans Thin"/>
+                        <a:cs typeface="Encode Sans Thin"/>
+                        <a:sym typeface="Encode Sans Thin"/>
+                      </a:rPr>
+                      <m:t>𝑥</m:t>
+                    </m:r>
+                    <m:r>
+                      <a:rPr lang="es-MX" sz="1000" b="0" i="1" smtClean="0">
+                        <a:solidFill>
+                          <a:schemeClr val="dk1"/>
+                        </a:solidFill>
+                        <a:latin typeface="+mn-lt"/>
+                        <a:ea typeface="Encode Sans Thin"/>
+                        <a:cs typeface="Encode Sans Thin"/>
+                        <a:sym typeface="Encode Sans Thin"/>
+                      </a:rPr>
+                      <m:t>3+ …</m:t>
+                    </m:r>
+                    <m:r>
+                      <a:rPr lang="es-MX" sz="1000" i="1">
+                        <a:solidFill>
+                          <a:schemeClr val="dk1"/>
+                        </a:solidFill>
+                        <a:latin typeface="+mn-lt"/>
+                        <a:ea typeface="Encode Sans Thin"/>
+                        <a:cs typeface="Encode Sans Thin"/>
+                        <a:sym typeface="Encode Sans Thin"/>
+                      </a:rPr>
+                      <m:t>+</m:t>
+                    </m:r>
+                    <m:r>
+                      <a:rPr lang="en-US" sz="1000" i="1">
+                        <a:solidFill>
+                          <a:schemeClr val="dk1"/>
+                        </a:solidFill>
+                        <a:latin typeface="+mn-lt"/>
+                        <a:ea typeface="Encode Sans Thin"/>
+                        <a:cs typeface="Encode Sans Thin"/>
+                        <a:sym typeface="Encode Sans Thin"/>
+                      </a:rPr>
+                      <m:t>𝛽</m:t>
+                    </m:r>
+                    <m:r>
+                      <a:rPr lang="es-MX" sz="1000" b="0" i="1" smtClean="0">
+                        <a:solidFill>
+                          <a:schemeClr val="dk1"/>
+                        </a:solidFill>
+                        <a:latin typeface="+mn-lt"/>
+                        <a:ea typeface="Encode Sans Thin"/>
+                        <a:cs typeface="Encode Sans Thin"/>
+                        <a:sym typeface="Encode Sans Thin"/>
+                      </a:rPr>
+                      <m:t>𝑛</m:t>
+                    </m:r>
+                    <m:r>
+                      <a:rPr lang="es-MX" sz="1000" i="1">
+                        <a:solidFill>
+                          <a:schemeClr val="dk1"/>
+                        </a:solidFill>
+                        <a:latin typeface="+mn-lt"/>
+                        <a:ea typeface="Encode Sans Thin"/>
+                        <a:cs typeface="Encode Sans Thin"/>
+                        <a:sym typeface="Encode Sans Thin"/>
+                      </a:rPr>
+                      <m:t>∗</m:t>
+                    </m:r>
+                    <m:r>
+                      <a:rPr lang="es-MX" sz="1000" i="1">
+                        <a:solidFill>
+                          <a:schemeClr val="dk1"/>
+                        </a:solidFill>
+                        <a:latin typeface="+mn-lt"/>
+                        <a:ea typeface="Encode Sans Thin"/>
+                        <a:cs typeface="Encode Sans Thin"/>
+                        <a:sym typeface="Encode Sans Thin"/>
+                      </a:rPr>
+                      <m:t>𝑥𝑛</m:t>
+                    </m:r>
+                  </m:oMath>
+                </a14:m>
+                <a:endParaRPr lang="es-MX" sz="1000" b="0" dirty="0">
+                  <a:solidFill>
+                    <a:schemeClr val="dk1"/>
+                  </a:solidFill>
+                  <a:latin typeface="+mn-lt"/>
+                  <a:ea typeface="Encode Sans Thin"/>
+                  <a:cs typeface="Encode Sans Thin"/>
+                  <a:sym typeface="Encode Sans Thin"/>
+                </a:endParaRPr>
+              </a:p>
+              <a:p>
+                <a:pPr lvl="0" algn="ctr">
+                  <a:lnSpc>
+                    <a:spcPct val="95000"/>
+                  </a:lnSpc>
+                  <a:buClr>
+                    <a:schemeClr val="dk1"/>
+                  </a:buClr>
+                  <a:buSzPts val="1200"/>
+                </a:pPr>
+                <a:r>
+                  <a:rPr lang="en-US" sz="1000" dirty="0" err="1">
+                    <a:solidFill>
+                      <a:schemeClr val="dk1"/>
+                    </a:solidFill>
+                    <a:latin typeface="+mn-lt"/>
+                  </a:rPr>
+                  <a:t>Donde</a:t>
+                </a:r>
+                <a:r>
+                  <a:rPr lang="en-US" sz="1000" dirty="0">
+                    <a:solidFill>
+                      <a:schemeClr val="dk1"/>
+                    </a:solidFill>
+                    <a:latin typeface="+mn-lt"/>
+                  </a:rPr>
+                  <a:t>: </a:t>
+                </a:r>
+              </a:p>
+              <a:p>
+                <a:pPr lvl="0" algn="ctr">
+                  <a:lnSpc>
+                    <a:spcPct val="95000"/>
+                  </a:lnSpc>
+                  <a:buClr>
+                    <a:schemeClr val="dk1"/>
+                  </a:buClr>
+                  <a:buSzPts val="1200"/>
+                </a:pPr>
+                <a:r>
+                  <a:rPr lang="en-US" sz="1000" dirty="0">
+                    <a:solidFill>
+                      <a:schemeClr val="dk1"/>
+                    </a:solidFill>
+                    <a:latin typeface="+mn-lt"/>
+                  </a:rPr>
+                  <a:t>y: Valor a </a:t>
+                </a:r>
+                <a:r>
+                  <a:rPr lang="en-US" sz="1000" dirty="0" err="1">
+                    <a:solidFill>
+                      <a:schemeClr val="dk1"/>
+                    </a:solidFill>
+                    <a:latin typeface="+mn-lt"/>
+                  </a:rPr>
+                  <a:t>pronosticar</a:t>
+                </a:r>
+                <a:r>
+                  <a:rPr lang="en-US" sz="1000" dirty="0">
+                    <a:solidFill>
+                      <a:schemeClr val="dk1"/>
+                    </a:solidFill>
+                    <a:latin typeface="+mn-lt"/>
+                  </a:rPr>
+                  <a:t> </a:t>
+                </a:r>
+              </a:p>
+              <a:p>
+                <a:pPr lvl="0" algn="ctr">
+                  <a:lnSpc>
+                    <a:spcPct val="95000"/>
+                  </a:lnSpc>
+                  <a:buClr>
+                    <a:schemeClr val="dk1"/>
+                  </a:buClr>
+                  <a:buSzPts val="1200"/>
+                </a:pPr>
+                <a:r>
+                  <a:rPr lang="en-US" sz="1000" b="0" i="0" dirty="0">
+                    <a:solidFill>
+                      <a:schemeClr val="dk1"/>
+                    </a:solidFill>
+                    <a:latin typeface="+mn-lt"/>
+                    <a:ea typeface="Cambria Math" panose="02040503050406030204" pitchFamily="18" charset="0"/>
+                    <a:sym typeface="Arial"/>
+                  </a:rPr>
+                  <a:t>𝛽: </a:t>
+                </a:r>
+                <a:r>
+                  <a:rPr lang="en-US" sz="1000" b="0" i="0" dirty="0" err="1">
+                    <a:solidFill>
+                      <a:schemeClr val="dk1"/>
+                    </a:solidFill>
+                    <a:latin typeface="+mn-lt"/>
+                    <a:ea typeface="Cambria Math" panose="02040503050406030204" pitchFamily="18" charset="0"/>
+                    <a:sym typeface="Arial"/>
+                  </a:rPr>
+                  <a:t>Parámetros</a:t>
+                </a:r>
+                <a:r>
+                  <a:rPr lang="en-US" sz="1000" b="0" i="0" dirty="0">
+                    <a:solidFill>
+                      <a:schemeClr val="dk1"/>
+                    </a:solidFill>
+                    <a:latin typeface="+mn-lt"/>
+                    <a:ea typeface="Cambria Math" panose="02040503050406030204" pitchFamily="18" charset="0"/>
+                    <a:sym typeface="Arial"/>
+                  </a:rPr>
+                  <a:t> a </a:t>
+                </a:r>
+                <a:r>
+                  <a:rPr lang="en-US" sz="1000" b="0" i="0" dirty="0" err="1">
+                    <a:solidFill>
+                      <a:schemeClr val="dk1"/>
+                    </a:solidFill>
+                    <a:latin typeface="+mn-lt"/>
+                    <a:ea typeface="Cambria Math" panose="02040503050406030204" pitchFamily="18" charset="0"/>
+                    <a:sym typeface="Arial"/>
+                  </a:rPr>
+                  <a:t>ajustar</a:t>
+                </a:r>
+                <a:r>
+                  <a:rPr lang="en-US" sz="1000" b="0" i="0" dirty="0">
+                    <a:solidFill>
+                      <a:schemeClr val="dk1"/>
+                    </a:solidFill>
+                    <a:latin typeface="+mn-lt"/>
+                    <a:ea typeface="Cambria Math" panose="02040503050406030204" pitchFamily="18" charset="0"/>
+                    <a:sym typeface="Arial"/>
+                  </a:rPr>
+                  <a:t> para </a:t>
+                </a:r>
+                <a:r>
+                  <a:rPr lang="en-US" sz="1000" b="0" i="0" dirty="0" err="1">
+                    <a:solidFill>
+                      <a:schemeClr val="dk1"/>
+                    </a:solidFill>
+                    <a:latin typeface="+mn-lt"/>
+                    <a:ea typeface="Cambria Math" panose="02040503050406030204" pitchFamily="18" charset="0"/>
+                    <a:sym typeface="Arial"/>
+                  </a:rPr>
+                  <a:t>cada</a:t>
+                </a:r>
+                <a:r>
+                  <a:rPr lang="en-US" sz="1000" b="0" i="0" dirty="0">
+                    <a:solidFill>
+                      <a:schemeClr val="dk1"/>
+                    </a:solidFill>
+                    <a:latin typeface="+mn-lt"/>
+                    <a:ea typeface="Cambria Math" panose="02040503050406030204" pitchFamily="18" charset="0"/>
+                    <a:sym typeface="Arial"/>
+                  </a:rPr>
+                  <a:t> </a:t>
+                </a:r>
+                <a:r>
+                  <a:rPr lang="en-US" sz="1000" b="0" i="0" dirty="0" err="1">
+                    <a:solidFill>
+                      <a:schemeClr val="dk1"/>
+                    </a:solidFill>
+                    <a:latin typeface="+mn-lt"/>
+                    <a:ea typeface="Cambria Math" panose="02040503050406030204" pitchFamily="18" charset="0"/>
+                    <a:sym typeface="Arial"/>
+                  </a:rPr>
+                  <a:t>caso</a:t>
+                </a:r>
+                <a:r>
+                  <a:rPr lang="en-US" sz="1000" b="0" i="0" dirty="0">
+                    <a:solidFill>
+                      <a:schemeClr val="dk1"/>
+                    </a:solidFill>
+                    <a:latin typeface="+mn-lt"/>
+                    <a:ea typeface="Cambria Math" panose="02040503050406030204" pitchFamily="18" charset="0"/>
+                    <a:sym typeface="Arial"/>
+                  </a:rPr>
+                  <a:t> </a:t>
+                </a:r>
+              </a:p>
+              <a:p>
+                <a:pPr lvl="0" algn="ctr">
+                  <a:lnSpc>
+                    <a:spcPct val="95000"/>
+                  </a:lnSpc>
+                  <a:buClr>
+                    <a:schemeClr val="dk1"/>
+                  </a:buClr>
+                  <a:buSzPts val="1200"/>
+                </a:pPr>
+                <a:r>
+                  <a:rPr lang="en-US" sz="1000" b="0" i="0" dirty="0">
+                    <a:solidFill>
+                      <a:schemeClr val="dk1"/>
+                    </a:solidFill>
+                    <a:latin typeface="+mn-lt"/>
+                    <a:ea typeface="Cambria Math" panose="02040503050406030204" pitchFamily="18" charset="0"/>
+                    <a:sym typeface="Arial"/>
+                  </a:rPr>
+                  <a:t>Xi: variables </a:t>
+                </a:r>
+                <a:r>
+                  <a:rPr lang="en-US" sz="1000" b="0" i="0" dirty="0" err="1">
+                    <a:solidFill>
+                      <a:schemeClr val="dk1"/>
+                    </a:solidFill>
+                    <a:latin typeface="+mn-lt"/>
+                    <a:ea typeface="Cambria Math" panose="02040503050406030204" pitchFamily="18" charset="0"/>
+                    <a:sym typeface="Arial"/>
+                  </a:rPr>
+                  <a:t>predictoras</a:t>
+                </a:r>
+                <a:r>
+                  <a:rPr lang="en-US" sz="1000" b="0" i="0" dirty="0">
+                    <a:solidFill>
+                      <a:schemeClr val="dk1"/>
+                    </a:solidFill>
+                    <a:latin typeface="+mn-lt"/>
+                    <a:ea typeface="Cambria Math" panose="02040503050406030204" pitchFamily="18" charset="0"/>
+                    <a:sym typeface="Arial"/>
+                  </a:rPr>
+                  <a:t> </a:t>
+                </a:r>
+                <a:r>
+                  <a:rPr lang="en-US" sz="1000" b="0" i="0" dirty="0" err="1">
+                    <a:solidFill>
+                      <a:schemeClr val="dk1"/>
+                    </a:solidFill>
+                    <a:latin typeface="+mn-lt"/>
+                    <a:ea typeface="Cambria Math" panose="02040503050406030204" pitchFamily="18" charset="0"/>
+                    <a:sym typeface="Arial"/>
+                  </a:rPr>
+                  <a:t>independientes</a:t>
+                </a:r>
+                <a:r>
+                  <a:rPr lang="en-US" sz="1000" b="0" i="0" dirty="0">
+                    <a:solidFill>
+                      <a:schemeClr val="dk1"/>
+                    </a:solidFill>
+                    <a:latin typeface="+mn-lt"/>
+                    <a:ea typeface="Cambria Math" panose="02040503050406030204" pitchFamily="18" charset="0"/>
+                    <a:sym typeface="Arial"/>
+                  </a:rPr>
+                  <a:t> entre </a:t>
+                </a:r>
+                <a:r>
+                  <a:rPr lang="en-US" sz="1000" b="0" i="0" dirty="0" err="1">
+                    <a:solidFill>
+                      <a:schemeClr val="dk1"/>
+                    </a:solidFill>
+                    <a:latin typeface="+mn-lt"/>
+                    <a:ea typeface="Cambria Math" panose="02040503050406030204" pitchFamily="18" charset="0"/>
+                    <a:sym typeface="Arial"/>
+                  </a:rPr>
+                  <a:t>si</a:t>
+                </a:r>
+                <a:endParaRPr lang="en-US" sz="1000" b="0" i="0" dirty="0">
+                  <a:solidFill>
+                    <a:schemeClr val="dk1"/>
+                  </a:solidFill>
+                  <a:latin typeface="+mn-lt"/>
+                  <a:sym typeface="Arial"/>
+                </a:endParaRPr>
+              </a:p>
+            </p:txBody>
+          </p:sp>
+        </mc:Choice>
+        <mc:Fallback>
+          <p:sp>
+            <p:nvSpPr>
+              <p:cNvPr id="7" name="Google Shape;88;p1">
+                <a:extLst>
+                  <a:ext uri="{FF2B5EF4-FFF2-40B4-BE49-F238E27FC236}">
+                    <a16:creationId xmlns:a16="http://schemas.microsoft.com/office/drawing/2014/main" id="{D710EB25-DDE1-53D5-9BFB-95579D8E7A2D}"/>
+                  </a:ext>
+                </a:extLst>
+              </p:cNvPr>
+              <p:cNvSpPr>
+                <a:spLocks noRot="1" noChangeAspect="1" noMove="1" noResize="1" noEditPoints="1" noAdjustHandles="1" noChangeArrowheads="1" noChangeShapeType="1" noTextEdit="1"/>
+              </p:cNvSpPr>
+              <p:nvPr/>
+            </p:nvSpPr>
+            <p:spPr>
+              <a:xfrm>
+                <a:off x="318486" y="3927582"/>
+                <a:ext cx="9134090" cy="3255285"/>
+              </a:xfrm>
+              <a:prstGeom prst="roundRect">
+                <a:avLst>
+                  <a:gd name="adj" fmla="val 1512"/>
+                </a:avLst>
+              </a:prstGeom>
+              <a:blipFill>
+                <a:blip r:embed="rId4"/>
+                <a:stretch>
+                  <a:fillRect/>
+                </a:stretch>
+              </a:blipFill>
+              <a:ln w="9525" cap="flat" cmpd="sng">
+                <a:solidFill>
+                  <a:schemeClr val="dk1"/>
+                </a:solidFill>
+                <a:prstDash val="solid"/>
+                <a:miter lim="800000"/>
+                <a:headEnd type="none" w="sm" len="sm"/>
+                <a:tailEnd type="none" w="sm" len="sm"/>
+              </a:ln>
+            </p:spPr>
+            <p:txBody>
+              <a:bodyPr/>
+              <a:lstStyle/>
+              <a:p>
+                <a:r>
+                  <a:rPr lang="es-MX">
+                    <a:noFill/>
+                  </a:rPr>
+                  <a:t> </a:t>
+                </a:r>
+              </a:p>
+            </p:txBody>
+          </p:sp>
+        </mc:Fallback>
+      </mc:AlternateContent>
       <p:sp>
         <p:nvSpPr>
           <p:cNvPr id="8" name="Google Shape;88;p1">
@@ -13901,7 +14585,7 @@
         <p:spPr>
           <a:xfrm>
             <a:off x="509587" y="4449513"/>
-            <a:ext cx="8751889" cy="1034517"/>
+            <a:ext cx="8844579" cy="856776"/>
           </a:xfrm>
           <a:prstGeom prst="rect">
             <a:avLst/>
@@ -13941,19 +14625,17 @@
                 </a:solidFill>
                 <a:latin typeface="+mn-lt"/>
               </a:rPr>
-              <a:t>La teoría de redes estudia temas tales como redes de telecomunicaciones, informáticas, biológicas, semánticas, cognitivas, y redes sociales, considerando distintos elementos o actores representados por nodos (o vértices) y las conexiones entre los elementos o actores como enlaces (o aristas)</a:t>
+              <a:t>La teoría de pronósticos busca determinar el valor más probable de una variable dependiente (Y) en función de variables independientes (x1,x2, x3, </a:t>
             </a:r>
-          </a:p>
-          <a:p>
-            <a:pPr algn="just">
-              <a:lnSpc>
-                <a:spcPct val="95000"/>
-              </a:lnSpc>
-              <a:buClr>
-                <a:schemeClr val="dk1"/>
-              </a:buClr>
-              <a:buSzPts val="1200"/>
-            </a:pPr>
+            <a:r>
+              <a:rPr lang="es-MX" sz="1100" dirty="0" err="1">
+                <a:solidFill>
+                  <a:schemeClr val="tx1"/>
+                </a:solidFill>
+                <a:latin typeface="+mn-lt"/>
+              </a:rPr>
+              <a:t>etc</a:t>
+            </a:r>
             <a:r>
               <a:rPr lang="es-MX" sz="1100" dirty="0">
                 <a:solidFill>
@@ -13961,7 +14643,7 @@
                 </a:solidFill>
                 <a:latin typeface="+mn-lt"/>
               </a:rPr>
-              <a:t>El árbol de expansión mínima es aquel que comienza desde un vértice y une todos los nodos del conjunto de tal manera que se conecten dichos nodos con el menor peso posible. </a:t>
+              <a:t>) . En este caso se abordarán dos casos principalmente , </a:t>
             </a:r>
           </a:p>
           <a:p>
@@ -13982,149 +14664,15 @@
               <a:buFont typeface="Times New Roman"/>
               <a:buNone/>
             </a:pPr>
-            <a:endParaRPr sz="1100" dirty="0">
-              <a:solidFill>
-                <a:schemeClr val="tx1"/>
-              </a:solidFill>
-              <a:latin typeface="+mn-lt"/>
-              <a:sym typeface="Encode Sans Thin"/>
-            </a:endParaRPr>
-          </a:p>
-        </p:txBody>
-      </p:sp>
-      <p:sp>
-        <p:nvSpPr>
-          <p:cNvPr id="15" name="Google Shape;89;p1">
-            <a:extLst>
-              <a:ext uri="{FF2B5EF4-FFF2-40B4-BE49-F238E27FC236}">
-                <a16:creationId xmlns:a16="http://schemas.microsoft.com/office/drawing/2014/main" id="{65D4916B-7BE9-5B74-0DAB-4413788FAF6A}"/>
-              </a:ext>
-            </a:extLst>
-          </p:cNvPr>
-          <p:cNvSpPr txBox="1"/>
-          <p:nvPr/>
-        </p:nvSpPr>
-        <p:spPr>
-          <a:xfrm>
-            <a:off x="573679" y="6592594"/>
-            <a:ext cx="8505035" cy="549769"/>
-          </a:xfrm>
-          <a:prstGeom prst="rect">
-            <a:avLst/>
-          </a:prstGeom>
-          <a:noFill/>
-          <a:ln>
-            <a:noFill/>
-          </a:ln>
-        </p:spPr>
-        <p:txBody>
-          <a:bodyPr spcFirstLastPara="1" wrap="square" lIns="52225" tIns="26100" rIns="52225" bIns="26100" anchor="t" anchorCtr="0">
-            <a:spAutoFit/>
-          </a:bodyPr>
-          <a:lstStyle/>
-          <a:p>
-            <a:pPr marL="0" marR="0" lvl="0" indent="0" algn="just" rtl="0">
-              <a:lnSpc>
-                <a:spcPct val="95000"/>
-              </a:lnSpc>
-              <a:spcBef>
-                <a:spcPts val="0"/>
-              </a:spcBef>
-              <a:spcAft>
-                <a:spcPts val="0"/>
-              </a:spcAft>
-              <a:buClr>
-                <a:schemeClr val="dk1"/>
-              </a:buClr>
-              <a:buSzPts val="1200"/>
-              <a:buFont typeface="Times New Roman"/>
-              <a:buNone/>
-            </a:pPr>
             <a:r>
               <a:rPr lang="es-MX" sz="1100" dirty="0">
                 <a:solidFill>
                   <a:schemeClr val="tx1"/>
                 </a:solidFill>
                 <a:latin typeface="+mn-lt"/>
-                <a:ea typeface="Encode Sans ExtraLight"/>
-                <a:cs typeface="Encode Sans ExtraLight"/>
-                <a:sym typeface="Encode Sans ExtraLight"/>
               </a:rPr>
-              <a:t>Fue</a:t>
+              <a:t>A) El modelo lineal generalizado para pronóstico en el que las variables x1, x2,..xn deben ser variables independientes entre si, pero que mantengan una relación (lineal con respecto al parámetro a estimar y por tanto con respecto a la variable independiente (Y)) y que tiene la siguiente forma: </a:t>
             </a:r>
-            <a:r>
-              <a:rPr lang="es-MX" sz="1100" dirty="0">
-                <a:solidFill>
-                  <a:schemeClr val="tx1"/>
-                </a:solidFill>
-                <a:latin typeface="+mn-lt"/>
-              </a:rPr>
-              <a:t> desarrollado por el científico checo </a:t>
-            </a:r>
-            <a:r>
-              <a:rPr lang="es-MX" sz="1100" dirty="0" err="1">
-                <a:solidFill>
-                  <a:schemeClr val="tx1"/>
-                </a:solidFill>
-                <a:latin typeface="+mn-lt"/>
-              </a:rPr>
-              <a:t>Otakar</a:t>
-            </a:r>
-            <a:r>
-              <a:rPr lang="es-MX" sz="1100" dirty="0">
-                <a:solidFill>
-                  <a:schemeClr val="tx1"/>
-                </a:solidFill>
-                <a:latin typeface="+mn-lt"/>
-              </a:rPr>
-              <a:t> </a:t>
-            </a:r>
-            <a:r>
-              <a:rPr lang="es-MX" sz="1100" dirty="0" err="1">
-                <a:solidFill>
-                  <a:schemeClr val="tx1"/>
-                </a:solidFill>
-                <a:latin typeface="+mn-lt"/>
-              </a:rPr>
-              <a:t>Boruvka</a:t>
-            </a:r>
-            <a:r>
-              <a:rPr lang="es-MX" sz="1100" dirty="0">
-                <a:solidFill>
-                  <a:schemeClr val="tx1"/>
-                </a:solidFill>
-                <a:latin typeface="+mn-lt"/>
-              </a:rPr>
-              <a:t> en 1926. Este algoritmo nace en el intento de encontrar una red eléctrica que fuese eficiente para Moravia (Republica Checa).</a:t>
-            </a:r>
-          </a:p>
-          <a:p>
-            <a:pPr marL="0" marR="0" lvl="0" indent="0" algn="just" rtl="0">
-              <a:lnSpc>
-                <a:spcPct val="95000"/>
-              </a:lnSpc>
-              <a:spcBef>
-                <a:spcPts val="0"/>
-              </a:spcBef>
-              <a:spcAft>
-                <a:spcPts val="0"/>
-              </a:spcAft>
-              <a:buClr>
-                <a:schemeClr val="dk1"/>
-              </a:buClr>
-              <a:buSzPts val="1200"/>
-              <a:buFont typeface="Times New Roman"/>
-              <a:buNone/>
-            </a:pPr>
-            <a:endParaRPr sz="1200" dirty="0">
-              <a:solidFill>
-                <a:schemeClr val="dk1"/>
-              </a:solidFill>
-              <a:latin typeface="Encode Sans Thin"/>
-              <a:ea typeface="Encode Sans Thin"/>
-              <a:cs typeface="Encode Sans Thin"/>
-              <a:sym typeface="Encode Sans Thin"/>
-            </a:endParaRPr>
           </a:p>
         </p:txBody>
       </p:sp>
@@ -14654,7 +15202,7 @@
           <p:nvPr/>
         </p:nvPicPr>
         <p:blipFill>
-          <a:blip r:embed="rId4">
+          <a:blip r:embed="rId5">
             <a:extLst>
               <a:ext uri="{28A0092B-C50C-407E-A947-70E740481C1C}">
                 <a14:useLocalDpi xmlns:a14="http://schemas.microsoft.com/office/drawing/2010/main" val="0"/>
@@ -15006,7 +15554,7 @@
                   <a:schemeClr val="tx1"/>
                 </a:solidFill>
                 <a:latin typeface="+mn-lt"/>
-                <a:hlinkClick r:id="rId5">
+                <a:hlinkClick r:id="rId6">
                   <a:extLst>
                     <a:ext uri="{A12FA001-AC4F-418D-AE19-62706E023703}">
                       <ahyp:hlinkClr xmlns:ahyp="http://schemas.microsoft.com/office/drawing/2018/hyperlinkcolor" val="tx"/>
@@ -15031,7 +15579,7 @@
                   <a:schemeClr val="tx1"/>
                 </a:solidFill>
                 <a:latin typeface="+mn-lt"/>
-                <a:hlinkClick r:id="rId6" tooltip="National Institute of Standards and Technology">
+                <a:hlinkClick r:id="rId7" tooltip="National Institute of Standards and Technology">
                   <a:extLst>
                     <a:ext uri="{A12FA001-AC4F-418D-AE19-62706E023703}">
                       <ahyp:hlinkClr xmlns:ahyp="http://schemas.microsoft.com/office/drawing/2018/hyperlinkcolor" val="tx"/>

</xml_diff>